<commit_message>
updated slides are added
</commit_message>
<xml_diff>
--- a/Presentation.pptx
+++ b/Presentation.pptx
@@ -4746,8 +4746,17 @@
           <a:p>
             <a:r>
               <a:rPr lang="en-US" dirty="0"/>
-              <a:t>3 — Recommendation &amp; Conclusion</a:t>
-            </a:r>
+              <a:t>3 </a:t>
+            </a:r>
+            <a:r>
+              <a:rPr lang="en-US" dirty="0" smtClean="0"/>
+              <a:t>—Summary and Futur</a:t>
+            </a:r>
+            <a:r>
+              <a:rPr lang="en-US" dirty="0" smtClean="0"/>
+              <a:t>e Scope</a:t>
+            </a:r>
+            <a:endParaRPr lang="en-US" dirty="0"/>
           </a:p>
           <a:p>
             <a:endParaRPr lang="en-US" dirty="0"/>
@@ -7614,7 +7623,7 @@
             </a:pPr>
             <a:r>
               <a:rPr lang="en-US" sz="2400" dirty="0" smtClean="0"/>
-              <a:t>	Did cleanup data and EDA to get some insights from graphs (like correlations between features , data distribution) etc. </a:t>
+              <a:t>EDA to get some insights from graphs (like correlations between features , data distribution) etc. </a:t>
             </a:r>
           </a:p>
           <a:p>

</xml_diff>